<commit_message>
add day 2 so far
</commit_message>
<xml_diff>
--- a/slides/block4.pptx
+++ b/slides/block4.pptx
@@ -203,7 +203,7 @@
           <a:p>
             <a:fld id="{3F5DAF9C-BFBB-7344-81B1-BA27AD60250B}" type="datetimeFigureOut">
               <a:rPr lang="en-KW" smtClean="0"/>
-              <a:t>03/10/2025</a:t>
+              <a:t>20/10/2025</a:t>
             </a:fld>
             <a:endParaRPr lang="en-KW"/>
           </a:p>
@@ -620,7 +620,7 @@
           <a:p>
             <a:fld id="{AB78BAB4-45D1-EE48-BF00-BF3F291908FD}" type="datetimeFigureOut">
               <a:rPr lang="en-KW" smtClean="0"/>
-              <a:t>03/10/2025</a:t>
+              <a:t>20/10/2025</a:t>
             </a:fld>
             <a:endParaRPr lang="en-KW"/>
           </a:p>
@@ -820,7 +820,7 @@
           <a:p>
             <a:fld id="{AB78BAB4-45D1-EE48-BF00-BF3F291908FD}" type="datetimeFigureOut">
               <a:rPr lang="en-KW" smtClean="0"/>
-              <a:t>03/10/2025</a:t>
+              <a:t>20/10/2025</a:t>
             </a:fld>
             <a:endParaRPr lang="en-KW"/>
           </a:p>
@@ -1030,7 +1030,7 @@
           <a:p>
             <a:fld id="{AB78BAB4-45D1-EE48-BF00-BF3F291908FD}" type="datetimeFigureOut">
               <a:rPr lang="en-KW" smtClean="0"/>
-              <a:t>03/10/2025</a:t>
+              <a:t>20/10/2025</a:t>
             </a:fld>
             <a:endParaRPr lang="en-KW"/>
           </a:p>
@@ -1253,7 +1253,7 @@
           <a:p>
             <a:fld id="{AB78BAB4-45D1-EE48-BF00-BF3F291908FD}" type="datetimeFigureOut">
               <a:rPr lang="en-KW" smtClean="0"/>
-              <a:t>03/10/2025</a:t>
+              <a:t>20/10/2025</a:t>
             </a:fld>
             <a:endParaRPr lang="en-KW"/>
           </a:p>
@@ -1529,7 +1529,7 @@
           <a:p>
             <a:fld id="{AB78BAB4-45D1-EE48-BF00-BF3F291908FD}" type="datetimeFigureOut">
               <a:rPr lang="en-KW" smtClean="0"/>
-              <a:t>03/10/2025</a:t>
+              <a:t>20/10/2025</a:t>
             </a:fld>
             <a:endParaRPr lang="en-KW"/>
           </a:p>
@@ -1841,7 +1841,7 @@
           <a:p>
             <a:fld id="{AB78BAB4-45D1-EE48-BF00-BF3F291908FD}" type="datetimeFigureOut">
               <a:rPr lang="en-KW" smtClean="0"/>
-              <a:t>03/10/2025</a:t>
+              <a:t>20/10/2025</a:t>
             </a:fld>
             <a:endParaRPr lang="en-KW"/>
           </a:p>
@@ -2272,7 +2272,7 @@
           <a:p>
             <a:fld id="{AB78BAB4-45D1-EE48-BF00-BF3F291908FD}" type="datetimeFigureOut">
               <a:rPr lang="en-KW" smtClean="0"/>
-              <a:t>03/10/2025</a:t>
+              <a:t>20/10/2025</a:t>
             </a:fld>
             <a:endParaRPr lang="en-KW"/>
           </a:p>
@@ -2414,7 +2414,7 @@
           <a:p>
             <a:fld id="{AB78BAB4-45D1-EE48-BF00-BF3F291908FD}" type="datetimeFigureOut">
               <a:rPr lang="en-KW" smtClean="0"/>
-              <a:t>03/10/2025</a:t>
+              <a:t>20/10/2025</a:t>
             </a:fld>
             <a:endParaRPr lang="en-KW"/>
           </a:p>
@@ -2527,7 +2527,7 @@
           <a:p>
             <a:fld id="{AB78BAB4-45D1-EE48-BF00-BF3F291908FD}" type="datetimeFigureOut">
               <a:rPr lang="en-KW" smtClean="0"/>
-              <a:t>03/10/2025</a:t>
+              <a:t>20/10/2025</a:t>
             </a:fld>
             <a:endParaRPr lang="en-KW"/>
           </a:p>
@@ -2840,7 +2840,7 @@
           <a:p>
             <a:fld id="{AB78BAB4-45D1-EE48-BF00-BF3F291908FD}" type="datetimeFigureOut">
               <a:rPr lang="en-KW" smtClean="0"/>
-              <a:t>03/10/2025</a:t>
+              <a:t>20/10/2025</a:t>
             </a:fld>
             <a:endParaRPr lang="en-KW"/>
           </a:p>
@@ -3129,7 +3129,7 @@
           <a:p>
             <a:fld id="{AB78BAB4-45D1-EE48-BF00-BF3F291908FD}" type="datetimeFigureOut">
               <a:rPr lang="en-KW" smtClean="0"/>
-              <a:t>03/10/2025</a:t>
+              <a:t>20/10/2025</a:t>
             </a:fld>
             <a:endParaRPr lang="en-KW"/>
           </a:p>
@@ -3372,7 +3372,7 @@
           <a:p>
             <a:fld id="{AB78BAB4-45D1-EE48-BF00-BF3F291908FD}" type="datetimeFigureOut">
               <a:rPr lang="en-KW" smtClean="0"/>
-              <a:t>03/10/2025</a:t>
+              <a:t>20/10/2025</a:t>
             </a:fld>
             <a:endParaRPr lang="en-KW"/>
           </a:p>
@@ -3845,9 +3845,10 @@
           </a:p>
           <a:p>
             <a:r>
-              <a:rPr lang="en-KW" dirty="0"/>
-              <a:t>October 19 2025</a:t>
-            </a:r>
+              <a:rPr lang="en-KW"/>
+              <a:t>October 2025</a:t>
+            </a:r>
+            <a:endParaRPr lang="en-KW" dirty="0"/>
           </a:p>
         </p:txBody>
       </p:sp>
@@ -3914,8 +3915,8 @@
           </a:p>
         </p:txBody>
       </p:sp>
-      <mc:AlternateContent xmlns:mc="http://schemas.openxmlformats.org/markup-compatibility/2006">
-        <mc:Choice xmlns:a14="http://schemas.microsoft.com/office/drawing/2010/main" Requires="a14">
+      <mc:AlternateContent xmlns:mc="http://schemas.openxmlformats.org/markup-compatibility/2006" xmlns:a14="http://schemas.microsoft.com/office/drawing/2010/main">
+        <mc:Choice Requires="a14">
           <p:sp>
             <p:nvSpPr>
               <p:cNvPr id="22" name="Content Placeholder 21">
@@ -4347,7 +4348,7 @@
             </p:txBody>
           </p:sp>
         </mc:Choice>
-        <mc:Fallback>
+        <mc:Fallback xmlns="">
           <p:sp>
             <p:nvSpPr>
               <p:cNvPr id="22" name="Content Placeholder 21">
@@ -4449,8 +4450,8 @@
           </a:p>
         </p:txBody>
       </p:sp>
-      <mc:AlternateContent xmlns:mc="http://schemas.openxmlformats.org/markup-compatibility/2006">
-        <mc:Choice xmlns:a14="http://schemas.microsoft.com/office/drawing/2010/main" Requires="a14">
+      <mc:AlternateContent xmlns:mc="http://schemas.openxmlformats.org/markup-compatibility/2006" xmlns:a14="http://schemas.microsoft.com/office/drawing/2010/main">
+        <mc:Choice Requires="a14">
           <p:sp>
             <p:nvSpPr>
               <p:cNvPr id="3" name="Content Placeholder 2">
@@ -4859,7 +4860,7 @@
             </p:txBody>
           </p:sp>
         </mc:Choice>
-        <mc:Fallback>
+        <mc:Fallback xmlns="">
           <p:sp>
             <p:nvSpPr>
               <p:cNvPr id="3" name="Content Placeholder 2">
@@ -6052,8 +6053,8 @@
           </a:p>
         </p:txBody>
       </p:sp>
-      <mc:AlternateContent xmlns:mc="http://schemas.openxmlformats.org/markup-compatibility/2006">
-        <mc:Choice xmlns:a14="http://schemas.microsoft.com/office/drawing/2010/main" Requires="a14">
+      <mc:AlternateContent xmlns:mc="http://schemas.openxmlformats.org/markup-compatibility/2006" xmlns:a14="http://schemas.microsoft.com/office/drawing/2010/main">
+        <mc:Choice Requires="a14">
           <p:sp>
             <p:nvSpPr>
               <p:cNvPr id="3" name="Content Placeholder 2">
@@ -6476,7 +6477,7 @@
             </p:txBody>
           </p:sp>
         </mc:Choice>
-        <mc:Fallback>
+        <mc:Fallback xmlns="">
           <p:sp>
             <p:nvSpPr>
               <p:cNvPr id="3" name="Content Placeholder 2">

</xml_diff>